<commit_message>
updated presentation, readme view link for it
</commit_message>
<xml_diff>
--- a/documentation/CS757 - Final Project Presentation.pptx
+++ b/documentation/CS757 - Final Project Presentation.pptx
@@ -5,7 +5,7 @@
     <p:sldMasterId id="2147483648" r:id="rId1"/>
   </p:sldMasterIdLst>
   <p:notesMasterIdLst>
-    <p:notesMasterId r:id="rId20"/>
+    <p:notesMasterId r:id="rId22"/>
   </p:notesMasterIdLst>
   <p:sldIdLst>
     <p:sldId id="256" r:id="rId2"/>
@@ -26,6 +26,8 @@
     <p:sldId id="272" r:id="rId17"/>
     <p:sldId id="271" r:id="rId18"/>
     <p:sldId id="273" r:id="rId19"/>
+    <p:sldId id="274" r:id="rId20"/>
+    <p:sldId id="275" r:id="rId21"/>
   </p:sldIdLst>
   <p:sldSz cx="12192000" cy="6858000"/>
   <p:notesSz cx="6858000" cy="9144000"/>
@@ -1237,6 +1239,174 @@
 </p:notes>
 </file>
 
+<file path=ppt/notesSlides/notesSlide18.xml><?xml version="1.0" encoding="utf-8"?>
+<p:notes xmlns:a="http://schemas.openxmlformats.org/drawingml/2006/main" xmlns:r="http://schemas.openxmlformats.org/officeDocument/2006/relationships" xmlns:p="http://schemas.openxmlformats.org/presentationml/2006/main">
+  <p:cSld>
+    <p:spTree>
+      <p:nvGrpSpPr>
+        <p:cNvPr id="1" name=""/>
+        <p:cNvGrpSpPr/>
+        <p:nvPr/>
+      </p:nvGrpSpPr>
+      <p:grpSpPr>
+        <a:xfrm>
+          <a:off x="0" y="0"/>
+          <a:ext cx="0" cy="0"/>
+          <a:chOff x="0" y="0"/>
+          <a:chExt cx="0" cy="0"/>
+        </a:xfrm>
+      </p:grpSpPr>
+      <p:sp>
+        <p:nvSpPr>
+          <p:cNvPr id="2" name="Slide Image Placeholder 1"/>
+          <p:cNvSpPr>
+            <a:spLocks noGrp="1" noRot="1" noChangeAspect="1"/>
+          </p:cNvSpPr>
+          <p:nvPr>
+            <p:ph type="sldImg"/>
+          </p:nvPr>
+        </p:nvSpPr>
+        <p:spPr/>
+      </p:sp>
+      <p:sp>
+        <p:nvSpPr>
+          <p:cNvPr id="3" name="Notes Placeholder 2"/>
+          <p:cNvSpPr>
+            <a:spLocks noGrp="1"/>
+          </p:cNvSpPr>
+          <p:nvPr>
+            <p:ph type="body" idx="1"/>
+          </p:nvPr>
+        </p:nvSpPr>
+        <p:spPr/>
+        <p:txBody>
+          <a:bodyPr/>
+          <a:lstStyle/>
+          <a:p>
+            <a:endParaRPr lang="en-US"/>
+          </a:p>
+        </p:txBody>
+      </p:sp>
+      <p:sp>
+        <p:nvSpPr>
+          <p:cNvPr id="4" name="Slide Number Placeholder 3"/>
+          <p:cNvSpPr>
+            <a:spLocks noGrp="1"/>
+          </p:cNvSpPr>
+          <p:nvPr>
+            <p:ph type="sldNum" sz="quarter" idx="10"/>
+          </p:nvPr>
+        </p:nvSpPr>
+        <p:spPr/>
+        <p:txBody>
+          <a:bodyPr/>
+          <a:lstStyle/>
+          <a:p>
+            <a:fld id="{E5AFBAA3-E115-4004-BA1D-8E5097FF83CC}" type="slidenum">
+              <a:rPr lang="en-US"/>
+              <a:t>18</a:t>
+            </a:fld>
+            <a:endParaRPr lang="en-US"/>
+          </a:p>
+        </p:txBody>
+      </p:sp>
+    </p:spTree>
+    <p:extLst>
+      <p:ext uri="{BB962C8B-B14F-4D97-AF65-F5344CB8AC3E}">
+        <p14:creationId xmlns:p14="http://schemas.microsoft.com/office/powerpoint/2010/main" val="3727329450"/>
+      </p:ext>
+    </p:extLst>
+  </p:cSld>
+  <p:clrMapOvr>
+    <a:masterClrMapping/>
+  </p:clrMapOvr>
+</p:notes>
+</file>
+
+<file path=ppt/notesSlides/notesSlide19.xml><?xml version="1.0" encoding="utf-8"?>
+<p:notes xmlns:a="http://schemas.openxmlformats.org/drawingml/2006/main" xmlns:r="http://schemas.openxmlformats.org/officeDocument/2006/relationships" xmlns:p="http://schemas.openxmlformats.org/presentationml/2006/main">
+  <p:cSld>
+    <p:spTree>
+      <p:nvGrpSpPr>
+        <p:cNvPr id="1" name=""/>
+        <p:cNvGrpSpPr/>
+        <p:nvPr/>
+      </p:nvGrpSpPr>
+      <p:grpSpPr>
+        <a:xfrm>
+          <a:off x="0" y="0"/>
+          <a:ext cx="0" cy="0"/>
+          <a:chOff x="0" y="0"/>
+          <a:chExt cx="0" cy="0"/>
+        </a:xfrm>
+      </p:grpSpPr>
+      <p:sp>
+        <p:nvSpPr>
+          <p:cNvPr id="2" name="Slide Image Placeholder 1"/>
+          <p:cNvSpPr>
+            <a:spLocks noGrp="1" noRot="1" noChangeAspect="1"/>
+          </p:cNvSpPr>
+          <p:nvPr>
+            <p:ph type="sldImg"/>
+          </p:nvPr>
+        </p:nvSpPr>
+        <p:spPr/>
+      </p:sp>
+      <p:sp>
+        <p:nvSpPr>
+          <p:cNvPr id="3" name="Notes Placeholder 2"/>
+          <p:cNvSpPr>
+            <a:spLocks noGrp="1"/>
+          </p:cNvSpPr>
+          <p:nvPr>
+            <p:ph type="body" idx="1"/>
+          </p:nvPr>
+        </p:nvSpPr>
+        <p:spPr/>
+        <p:txBody>
+          <a:bodyPr/>
+          <a:lstStyle/>
+          <a:p>
+            <a:endParaRPr lang="en-US"/>
+          </a:p>
+        </p:txBody>
+      </p:sp>
+      <p:sp>
+        <p:nvSpPr>
+          <p:cNvPr id="4" name="Slide Number Placeholder 3"/>
+          <p:cNvSpPr>
+            <a:spLocks noGrp="1"/>
+          </p:cNvSpPr>
+          <p:nvPr>
+            <p:ph type="sldNum" sz="quarter" idx="10"/>
+          </p:nvPr>
+        </p:nvSpPr>
+        <p:spPr/>
+        <p:txBody>
+          <a:bodyPr/>
+          <a:lstStyle/>
+          <a:p>
+            <a:fld id="{E5AFBAA3-E115-4004-BA1D-8E5097FF83CC}" type="slidenum">
+              <a:rPr lang="en-US"/>
+              <a:t>19</a:t>
+            </a:fld>
+            <a:endParaRPr lang="en-US"/>
+          </a:p>
+        </p:txBody>
+      </p:sp>
+    </p:spTree>
+    <p:extLst>
+      <p:ext uri="{BB962C8B-B14F-4D97-AF65-F5344CB8AC3E}">
+        <p14:creationId xmlns:p14="http://schemas.microsoft.com/office/powerpoint/2010/main" val="2535329887"/>
+      </p:ext>
+    </p:extLst>
+  </p:cSld>
+  <p:clrMapOvr>
+    <a:masterClrMapping/>
+  </p:clrMapOvr>
+</p:notes>
+</file>
+
 <file path=ppt/notesSlides/notesSlide2.xml><?xml version="1.0" encoding="utf-8"?>
 <p:notes xmlns:a="http://schemas.openxmlformats.org/drawingml/2006/main" xmlns:r="http://schemas.openxmlformats.org/officeDocument/2006/relationships" xmlns:p="http://schemas.openxmlformats.org/presentationml/2006/main">
   <p:cSld>
@@ -1312,6 +1482,90 @@
     <p:extLst>
       <p:ext uri="{BB962C8B-B14F-4D97-AF65-F5344CB8AC3E}">
         <p14:creationId xmlns:p14="http://schemas.microsoft.com/office/powerpoint/2010/main" val="235632617"/>
+      </p:ext>
+    </p:extLst>
+  </p:cSld>
+  <p:clrMapOvr>
+    <a:masterClrMapping/>
+  </p:clrMapOvr>
+</p:notes>
+</file>
+
+<file path=ppt/notesSlides/notesSlide20.xml><?xml version="1.0" encoding="utf-8"?>
+<p:notes xmlns:a="http://schemas.openxmlformats.org/drawingml/2006/main" xmlns:r="http://schemas.openxmlformats.org/officeDocument/2006/relationships" xmlns:p="http://schemas.openxmlformats.org/presentationml/2006/main">
+  <p:cSld>
+    <p:spTree>
+      <p:nvGrpSpPr>
+        <p:cNvPr id="1" name=""/>
+        <p:cNvGrpSpPr/>
+        <p:nvPr/>
+      </p:nvGrpSpPr>
+      <p:grpSpPr>
+        <a:xfrm>
+          <a:off x="0" y="0"/>
+          <a:ext cx="0" cy="0"/>
+          <a:chOff x="0" y="0"/>
+          <a:chExt cx="0" cy="0"/>
+        </a:xfrm>
+      </p:grpSpPr>
+      <p:sp>
+        <p:nvSpPr>
+          <p:cNvPr id="2" name="Slide Image Placeholder 1"/>
+          <p:cNvSpPr>
+            <a:spLocks noGrp="1" noRot="1" noChangeAspect="1"/>
+          </p:cNvSpPr>
+          <p:nvPr>
+            <p:ph type="sldImg"/>
+          </p:nvPr>
+        </p:nvSpPr>
+        <p:spPr/>
+      </p:sp>
+      <p:sp>
+        <p:nvSpPr>
+          <p:cNvPr id="3" name="Notes Placeholder 2"/>
+          <p:cNvSpPr>
+            <a:spLocks noGrp="1"/>
+          </p:cNvSpPr>
+          <p:nvPr>
+            <p:ph type="body" idx="1"/>
+          </p:nvPr>
+        </p:nvSpPr>
+        <p:spPr/>
+        <p:txBody>
+          <a:bodyPr/>
+          <a:lstStyle/>
+          <a:p>
+            <a:endParaRPr lang="en-US"/>
+          </a:p>
+        </p:txBody>
+      </p:sp>
+      <p:sp>
+        <p:nvSpPr>
+          <p:cNvPr id="4" name="Slide Number Placeholder 3"/>
+          <p:cNvSpPr>
+            <a:spLocks noGrp="1"/>
+          </p:cNvSpPr>
+          <p:nvPr>
+            <p:ph type="sldNum" sz="quarter" idx="10"/>
+          </p:nvPr>
+        </p:nvSpPr>
+        <p:spPr/>
+        <p:txBody>
+          <a:bodyPr/>
+          <a:lstStyle/>
+          <a:p>
+            <a:fld id="{E5AFBAA3-E115-4004-BA1D-8E5097FF83CC}" type="slidenum">
+              <a:rPr lang="en-US"/>
+              <a:t>20</a:t>
+            </a:fld>
+            <a:endParaRPr lang="en-US"/>
+          </a:p>
+        </p:txBody>
+      </p:sp>
+    </p:spTree>
+    <p:extLst>
+      <p:ext uri="{BB962C8B-B14F-4D97-AF65-F5344CB8AC3E}">
+        <p14:creationId xmlns:p14="http://schemas.microsoft.com/office/powerpoint/2010/main" val="2355294033"/>
       </p:ext>
     </p:extLst>
   </p:cSld>
@@ -7707,7 +7961,7 @@
           <a:p>
             <a:r>
               <a:rPr lang="en-US"/>
-              <a:t>::STEP2: Hierarchical Clustering</a:t>
+              <a:t>::STEP2: Point Assignment</a:t>
             </a:r>
           </a:p>
         </p:txBody>
@@ -7738,7 +7992,7 @@
             <a:pPr lvl="1"/>
             <a:r>
               <a:rPr lang="en-US"/>
-              <a:t>Sub-cluster centroids using stronger distance metric</a:t>
+              <a:t>Assign points to closest centroid using various similarity metrics (Jaccard bag and cosine)</a:t>
             </a:r>
           </a:p>
           <a:p>
@@ -7765,7 +8019,7 @@
             <a:pPr lvl="1"/>
             <a:r>
               <a:rPr lang="en-US"/>
-              <a:t>Number of clusters produced : 7 (+1 "unclustered" cluster)  </a:t>
+              <a:t>Number of clusters produced : 7 (+1 "unclustered" group)  </a:t>
             </a:r>
           </a:p>
           <a:p>
@@ -7861,7 +8115,10 @@
             </a:r>
           </a:p>
           <a:p>
-            <a:endParaRPr lang="en-US"/>
+            <a:r>
+              <a:rPr lang="en-US"/>
+              <a:t>Analyzed user attributes within each cluster, with comparisons to the average</a:t>
+            </a:r>
           </a:p>
           <a:p>
             <a:endParaRPr lang="en-US"/>
@@ -7944,98 +8201,25 @@
         <p:spPr/>
         <p:txBody>
           <a:bodyPr vert="horz" lIns="91440" tIns="45720" rIns="91440" bIns="45720" rtlCol="0" anchor="t">
-            <a:normAutofit lnSpcReduction="10000"/>
+            <a:normAutofit fontScale="92500" lnSpcReduction="10000"/>
           </a:bodyPr>
           <a:lstStyle/>
           <a:p>
-            <a:endParaRPr lang="en-US" dirty="0"/>
-          </a:p>
-          <a:p>
-            <a:r>
-              <a:rPr lang="en-US" b="1" dirty="0" smtClean="0">
-                <a:latin typeface="Arial" charset="0"/>
-                <a:cs typeface="Arial" charset="0"/>
-              </a:rPr>
-              <a:t>Low male </a:t>
-            </a:r>
             <a:r>
               <a:rPr lang="en-US" b="1" dirty="0">
                 <a:latin typeface="Arial" charset="0"/>
                 <a:cs typeface="Arial" charset="0"/>
               </a:rPr>
-              <a:t>0.640625    </a:t>
-            </a:r>
-            <a:r>
-              <a:rPr lang="en-US" b="1" dirty="0" smtClean="0">
-                <a:latin typeface="Arial" charset="0"/>
-                <a:cs typeface="Arial" charset="0"/>
-              </a:rPr>
-              <a:t>(lower </a:t>
-            </a:r>
+              <a:t>Low male 64%    (lower than normal, 72%)</a:t>
+            </a:r>
+          </a:p>
+          <a:p>
             <a:r>
               <a:rPr lang="en-US" b="1" dirty="0">
                 <a:latin typeface="Arial" charset="0"/>
                 <a:cs typeface="Arial" charset="0"/>
               </a:rPr>
-              <a:t>than </a:t>
-            </a:r>
-            <a:r>
-              <a:rPr lang="en-US" b="1" dirty="0" smtClean="0">
-                <a:latin typeface="Arial" charset="0"/>
-                <a:cs typeface="Arial" charset="0"/>
-              </a:rPr>
-              <a:t>normal)</a:t>
-            </a:r>
-            <a:endParaRPr lang="en-US" b="1" dirty="0">
-              <a:latin typeface="Arial" charset="0"/>
-              <a:cs typeface="Arial" charset="0"/>
-            </a:endParaRPr>
-          </a:p>
-          <a:p>
-            <a:pPr marL="0" indent="0">
-              <a:buNone/>
-            </a:pPr>
-            <a:r>
-              <a:rPr lang="en-US" b="1" dirty="0" smtClean="0">
-                <a:latin typeface="Arial" charset="0"/>
-                <a:cs typeface="Arial" charset="0"/>
-              </a:rPr>
-              <a:t>Low </a:t>
-            </a:r>
-            <a:r>
-              <a:rPr lang="en-US" b="1" dirty="0" smtClean="0">
-                <a:latin typeface="Arial" charset="0"/>
-                <a:cs typeface="Arial" charset="0"/>
-              </a:rPr>
-              <a:t>technician/engineer </a:t>
-            </a:r>
-            <a:r>
-              <a:rPr lang="en-US" b="1" dirty="0">
-                <a:latin typeface="Arial" charset="0"/>
-                <a:cs typeface="Arial" charset="0"/>
-              </a:rPr>
-              <a:t>0.068359375 </a:t>
-            </a:r>
-            <a:r>
-              <a:rPr lang="en-US" b="1" dirty="0" smtClean="0">
-                <a:latin typeface="Arial" charset="0"/>
-                <a:cs typeface="Arial" charset="0"/>
-              </a:rPr>
-              <a:t>(much </a:t>
-            </a:r>
-            <a:r>
-              <a:rPr lang="en-US" b="1" dirty="0">
-                <a:latin typeface="Arial" charset="0"/>
-                <a:cs typeface="Arial" charset="0"/>
-              </a:rPr>
-              <a:t>lower than </a:t>
-            </a:r>
-            <a:r>
-              <a:rPr lang="en-US" b="1" dirty="0" smtClean="0">
-                <a:latin typeface="Arial" charset="0"/>
-                <a:cs typeface="Arial" charset="0"/>
-              </a:rPr>
-              <a:t>normal)</a:t>
+              <a:t>Low technician/engineer 6.8% (lower than normal, 8.3%)</a:t>
             </a:r>
           </a:p>
           <a:p>
@@ -8052,7 +8236,7 @@
               <a:buNone/>
             </a:pPr>
             <a:r>
-              <a:rPr lang="en-US" b="1" dirty="0" smtClean="0">
+              <a:rPr lang="en-US" b="1" dirty="0">
                 <a:latin typeface="Arial" charset="0"/>
                 <a:cs typeface="Arial" charset="0"/>
               </a:rPr>
@@ -8068,22 +8252,24 @@
                 <a:latin typeface="Arial" charset="0"/>
                 <a:cs typeface="Arial" charset="0"/>
               </a:rPr>
-              <a:t>	</a:t>
-            </a:r>
-            <a:r>
-              <a:rPr lang="en-US" b="1" dirty="0" smtClean="0">
-                <a:latin typeface="Arial" charset="0"/>
-                <a:cs typeface="Arial" charset="0"/>
-              </a:rPr>
-              <a:t>To Die For, Serial Mom, Getting Away With Murder</a:t>
+              <a:t>	To Die For, Serial Mom, Getting Away With Murder, All About Eve</a:t>
             </a:r>
           </a:p>
           <a:p>
             <a:pPr marL="0" indent="0">
               <a:buNone/>
             </a:pPr>
-            <a:r>
-              <a:rPr lang="en-US" b="1" dirty="0" smtClean="0">
+            <a:endParaRPr lang="en-US" b="1" dirty="0">
+              <a:latin typeface="Arial" charset="0"/>
+              <a:cs typeface="Arial" charset="0"/>
+            </a:endParaRPr>
+          </a:p>
+          <a:p>
+            <a:pPr marL="0" indent="0">
+              <a:buNone/>
+            </a:pPr>
+            <a:r>
+              <a:rPr lang="en-US" b="1" dirty="0">
                 <a:latin typeface="Arial" charset="0"/>
                 <a:cs typeface="Arial" charset="0"/>
               </a:rPr>
@@ -8099,21 +8285,14 @@
                 <a:latin typeface="Arial" charset="0"/>
                 <a:cs typeface="Arial" charset="0"/>
               </a:rPr>
-              <a:t>	</a:t>
-            </a:r>
-            <a:r>
-              <a:rPr lang="en-US" b="1" dirty="0" smtClean="0">
+              <a:t>	Mission Impossible, The Specialist, </a:t>
+            </a:r>
+            <a:r>
+              <a:rPr lang="en-US" b="1" dirty="0" err="1">
                 <a:latin typeface="Arial" charset="0"/>
                 <a:cs typeface="Arial" charset="0"/>
               </a:rPr>
-              <a:t>Mission Impossible, The Specialist, </a:t>
-            </a:r>
-            <a:r>
-              <a:rPr lang="en-US" b="1" dirty="0" err="1" smtClean="0">
-                <a:latin typeface="Arial" charset="0"/>
-                <a:cs typeface="Arial" charset="0"/>
-              </a:rPr>
-              <a:t>Tron</a:t>
+              <a:t>Tron, Star Wars: A New Hope</a:t>
             </a:r>
             <a:endParaRPr lang="en-US" b="1" dirty="0">
               <a:latin typeface="Arial" charset="0"/>
@@ -8205,7 +8384,7 @@
         <p:spPr/>
         <p:txBody>
           <a:bodyPr vert="horz" lIns="91440" tIns="45720" rIns="91440" bIns="45720" rtlCol="0" anchor="t">
-            <a:normAutofit lnSpcReduction="10000"/>
+            <a:normAutofit/>
           </a:bodyPr>
           <a:lstStyle/>
           <a:p>
@@ -8226,7 +8405,7 @@
                 <a:latin typeface="Arial" charset="0"/>
                 <a:cs typeface="Arial" charset="0"/>
               </a:rPr>
-              <a:t>male 0.7634112792297112 slightly higher than normal</a:t>
+              <a:t>male 76% slightly higher than normal</a:t>
             </a:r>
           </a:p>
           <a:p>
@@ -8238,7 +8417,7 @@
                 <a:latin typeface="Arial" charset="0"/>
                 <a:cs typeface="Arial" charset="0"/>
               </a:rPr>
-              <a:t>programmer 0.07840440165061899 slightly higher</a:t>
+              <a:t>programmer 7.8% slightly higher</a:t>
             </a:r>
           </a:p>
           <a:p>
@@ -8250,7 +8429,7 @@
                 <a:latin typeface="Arial" charset="0"/>
                 <a:cs typeface="Arial" charset="0"/>
               </a:rPr>
-              <a:t>retired 0.04126547455295736 higher the average</a:t>
+              <a:t>retired 4.1% higher the average</a:t>
             </a:r>
           </a:p>
           <a:p>
@@ -8262,14 +8441,19 @@
                 <a:latin typeface="Arial" charset="0"/>
                 <a:cs typeface="Arial" charset="0"/>
               </a:rPr>
-              <a:t>technician/engineer 0.08940852819807428 not much higher but highest among all the </a:t>
-            </a:r>
-            <a:r>
-              <a:rPr lang="en-US" b="1" dirty="0" smtClean="0">
+              <a:t>technician/engineer 8.9% not much higher but highest among all the cluster</a:t>
+            </a:r>
+          </a:p>
+          <a:p>
+            <a:pPr marL="0" indent="0">
+              <a:buNone/>
+            </a:pPr>
+            <a:r>
+              <a:rPr lang="en-US" b="1" dirty="0">
                 <a:latin typeface="Arial" charset="0"/>
                 <a:cs typeface="Arial" charset="0"/>
               </a:rPr>
-              <a:t>cluster</a:t>
+              <a:t>MOVIES THEY LIKE: Pi, The Phantom, Richie Rich</a:t>
             </a:r>
           </a:p>
           <a:p>
@@ -8277,47 +8461,7 @@
               <a:buNone/>
             </a:pPr>
             <a:r>
-              <a:rPr lang="en-US" b="1" dirty="0" smtClean="0">
-                <a:latin typeface="Arial" charset="0"/>
-                <a:cs typeface="Arial" charset="0"/>
-              </a:rPr>
-              <a:t>MOVIES THEY LIKE: La </a:t>
-            </a:r>
-            <a:r>
-              <a:rPr lang="en-US" b="1" dirty="0" err="1" smtClean="0">
-                <a:latin typeface="Arial" charset="0"/>
-                <a:cs typeface="Arial" charset="0"/>
-              </a:rPr>
-              <a:t>Fille</a:t>
-            </a:r>
-            <a:r>
-              <a:rPr lang="en-US" b="1" dirty="0" smtClean="0">
-                <a:latin typeface="Arial" charset="0"/>
-                <a:cs typeface="Arial" charset="0"/>
-              </a:rPr>
-              <a:t> </a:t>
-            </a:r>
-            <a:r>
-              <a:rPr lang="en-US" b="1" dirty="0" err="1" smtClean="0">
-                <a:latin typeface="Arial" charset="0"/>
-                <a:cs typeface="Arial" charset="0"/>
-              </a:rPr>
-              <a:t>Seule</a:t>
-            </a:r>
-            <a:r>
-              <a:rPr lang="en-US" b="1" dirty="0" smtClean="0">
-                <a:latin typeface="Arial" charset="0"/>
-                <a:cs typeface="Arial" charset="0"/>
-              </a:rPr>
-              <a:t>, Striking Distance, Winnie The Pooh and the Blustery Day</a:t>
-            </a:r>
-          </a:p>
-          <a:p>
-            <a:pPr marL="0" indent="0">
-              <a:buNone/>
-            </a:pPr>
-            <a:r>
-              <a:rPr lang="en-US" b="1" dirty="0" smtClean="0">
+              <a:rPr lang="en-US" b="1" dirty="0">
                 <a:latin typeface="Arial" charset="0"/>
                 <a:cs typeface="Arial" charset="0"/>
               </a:rPr>
@@ -8382,13 +8526,8 @@
           <a:p>
             <a:r>
               <a:rPr lang="en-US" dirty="0"/>
-              <a:t>::CLUSTER </a:t>
-            </a:r>
-            <a:r>
-              <a:rPr lang="en-US" dirty="0" smtClean="0"/>
-              <a:t>3 (Thrillers)  </a:t>
-            </a:r>
-            <a:endParaRPr lang="en-US" dirty="0"/>
+              <a:t>::CLUSTER 3 (Godzilla)  </a:t>
+            </a:r>
           </a:p>
         </p:txBody>
       </p:sp>
@@ -8405,7 +8544,7 @@
         <p:spPr/>
         <p:txBody>
           <a:bodyPr vert="horz" lIns="91440" tIns="45720" rIns="91440" bIns="45720" rtlCol="0" anchor="t">
-            <a:normAutofit fontScale="92500" lnSpcReduction="10000"/>
+            <a:normAutofit/>
           </a:bodyPr>
           <a:lstStyle/>
           <a:p>
@@ -8421,57 +8560,36 @@
             <a:pPr marL="0" indent="0">
               <a:buNone/>
             </a:pPr>
-            <a:r>
-              <a:rPr lang="en-US" b="1" dirty="0" smtClean="0">
-                <a:latin typeface="Arial" charset="0"/>
-                <a:cs typeface="Arial" charset="0"/>
-              </a:rPr>
-              <a:t>Low male </a:t>
-            </a:r>
             <a:r>
               <a:rPr lang="en-US" b="1" dirty="0">
                 <a:latin typeface="Arial" charset="0"/>
                 <a:cs typeface="Arial" charset="0"/>
               </a:rPr>
-              <a:t>0.6265822784810127 much lower than normal</a:t>
+              <a:t>Low male 63%</a:t>
             </a:r>
           </a:p>
           <a:p>
             <a:pPr marL="0" indent="0">
               <a:buNone/>
             </a:pPr>
-            <a:r>
-              <a:rPr lang="en-US" b="1" dirty="0" smtClean="0">
-                <a:latin typeface="Arial" charset="0"/>
-                <a:cs typeface="Arial" charset="0"/>
-              </a:rPr>
-              <a:t>Low academic/educator </a:t>
-            </a:r>
             <a:r>
               <a:rPr lang="en-US" b="1" dirty="0">
                 <a:latin typeface="Arial" charset="0"/>
                 <a:cs typeface="Arial" charset="0"/>
               </a:rPr>
-              <a:t>0.1371308016877637 much higher than normal</a:t>
+              <a:t>Higher academic/educator 14% </a:t>
             </a:r>
           </a:p>
           <a:p>
             <a:pPr marL="0" indent="0" algn="just">
               <a:buNone/>
             </a:pPr>
-            <a:r>
-              <a:rPr lang="en-US" b="1" dirty="0" smtClean="0">
-                <a:latin typeface="Arial" charset="0"/>
-                <a:cs typeface="Arial" charset="0"/>
-              </a:rPr>
-              <a:t>Low college/grad </a:t>
-            </a:r>
             <a:r>
               <a:rPr lang="en-US" b="1" dirty="0">
                 <a:latin typeface="Arial" charset="0"/>
                 <a:cs typeface="Arial" charset="0"/>
               </a:rPr>
-              <a:t>student 0.06962025316455696</a:t>
+              <a:t>Low college/grad student 7%</a:t>
             </a:r>
             <a:r>
               <a:rPr lang="en-US" b="1" i="1" dirty="0">
@@ -8485,63 +8603,45 @@
                 <a:latin typeface="Arial" charset="0"/>
                 <a:cs typeface="Arial" charset="0"/>
               </a:rPr>
-              <a:t>much lower than normal, almost half</a:t>
+              <a:t>almost half as rest</a:t>
             </a:r>
           </a:p>
           <a:p>
             <a:pPr marL="0" indent="0">
               <a:buNone/>
             </a:pPr>
-            <a:r>
-              <a:rPr lang="en-US" b="1" dirty="0" smtClean="0">
-                <a:latin typeface="Arial" charset="0"/>
-                <a:cs typeface="Arial" charset="0"/>
-              </a:rPr>
-              <a:t>Higher </a:t>
-            </a:r>
             <a:r>
               <a:rPr lang="en-US" b="1" dirty="0">
                 <a:latin typeface="Arial" charset="0"/>
                 <a:cs typeface="Arial" charset="0"/>
               </a:rPr>
-              <a:t>in Age than </a:t>
-            </a:r>
-            <a:r>
-              <a:rPr lang="en-US" b="1" dirty="0" smtClean="0">
+              <a:t>High concentration of users over 35</a:t>
+            </a:r>
+            <a:endParaRPr lang="en-US" dirty="0"/>
+          </a:p>
+          <a:p>
+            <a:pPr marL="0" indent="0">
+              <a:buNone/>
+            </a:pPr>
+            <a:r>
+              <a:rPr lang="en-US" b="1" dirty="0">
                 <a:latin typeface="Arial" charset="0"/>
                 <a:cs typeface="Arial" charset="0"/>
               </a:rPr>
-              <a:t>Normal</a:t>
-            </a:r>
-            <a:endParaRPr lang="en-US" dirty="0"/>
+              <a:t>MOVIES THEY LIKE: Godzilla (1998), Godzilla (1984), Godzilla (1958), Star Wars: Empire Strikes Back</a:t>
+            </a:r>
           </a:p>
           <a:p>
             <a:pPr marL="0" indent="0">
               <a:buNone/>
             </a:pPr>
             <a:r>
-              <a:rPr lang="en-US" b="1" dirty="0" smtClean="0">
+              <a:rPr lang="en-US" b="1" dirty="0">
                 <a:latin typeface="Arial" charset="0"/>
                 <a:cs typeface="Arial" charset="0"/>
               </a:rPr>
-              <a:t>MOVIES THEY LIKE: The Rock, Twister, The Nutty Professor</a:t>
-            </a:r>
-          </a:p>
-          <a:p>
-            <a:pPr marL="0" indent="0">
-              <a:buNone/>
-            </a:pPr>
-            <a:r>
-              <a:rPr lang="en-US" b="1" dirty="0" smtClean="0">
-                <a:latin typeface="Arial" charset="0"/>
-                <a:cs typeface="Arial" charset="0"/>
-              </a:rPr>
-              <a:t>MOVIES THEY HATE: The Hippie Revolution, Father Of the Bride </a:t>
-            </a:r>
-            <a:endParaRPr lang="en-US" b="1" dirty="0">
-              <a:latin typeface="Arial" charset="0"/>
-              <a:cs typeface="Arial" charset="0"/>
-            </a:endParaRPr>
+              <a:t>MOVIES THEY HATE: Ben-Hur, The Maltese Falcon</a:t>
+            </a:r>
           </a:p>
         </p:txBody>
       </p:sp>
@@ -8592,13 +8692,8 @@
           <a:p>
             <a:r>
               <a:rPr lang="en-US" dirty="0"/>
-              <a:t>::CLUSTER </a:t>
-            </a:r>
-            <a:r>
-              <a:rPr lang="en-US" dirty="0" smtClean="0"/>
-              <a:t>4 (Godzilla)</a:t>
-            </a:r>
-            <a:endParaRPr lang="en-US" dirty="0"/>
+              <a:t>::CLUSTER 4 (Foreign Films)</a:t>
+            </a:r>
           </a:p>
         </p:txBody>
       </p:sp>
@@ -8628,27 +8723,18 @@
             <a:pPr marL="0" indent="0">
               <a:buNone/>
             </a:pPr>
-            <a:r>
-              <a:rPr lang="en-US" b="1" dirty="0" smtClean="0">
-                <a:latin typeface="Arial" charset="0"/>
-                <a:cs typeface="Arial" charset="0"/>
-              </a:rPr>
-              <a:t>Low male </a:t>
-            </a:r>
             <a:r>
               <a:rPr lang="en-US" b="1" dirty="0">
                 <a:latin typeface="Arial" charset="0"/>
                 <a:cs typeface="Arial" charset="0"/>
               </a:rPr>
-              <a:t>0.6524822695035462 lower </a:t>
-            </a:r>
-            <a:r>
-              <a:rPr lang="en-US" b="1" dirty="0" smtClean="0">
-                <a:latin typeface="Arial" charset="0"/>
-                <a:cs typeface="Arial" charset="0"/>
-              </a:rPr>
-              <a:t>than normal</a:t>
-            </a:r>
+              <a:t>Low male 65% lower than normal</a:t>
+            </a:r>
+          </a:p>
+          <a:p>
+            <a:pPr marL="0" indent="0">
+              <a:buNone/>
+            </a:pPr>
             <a:endParaRPr lang="en-US" b="1" dirty="0">
               <a:latin typeface="Arial" charset="0"/>
               <a:cs typeface="Arial" charset="0"/>
@@ -8658,7 +8744,21 @@
             <a:pPr marL="0" indent="0">
               <a:buNone/>
             </a:pPr>
-            <a:endParaRPr lang="en-US" b="1" dirty="0" smtClean="0">
+            <a:r>
+              <a:rPr lang="en-US" b="1" dirty="0">
+                <a:latin typeface="Arial" charset="0"/>
+                <a:cs typeface="Arial" charset="0"/>
+              </a:rPr>
+              <a:t>MOVIES THEY LIKE: </a:t>
+            </a:r>
+            <a:r>
+              <a:rPr lang="it-IT" b="1" dirty="0">
+                <a:latin typeface="Arial" charset="0"/>
+                <a:cs typeface="Arial" charset="0"/>
+              </a:rPr>
+              <a:t>L'Associe, Autoportrait de Decembre, L bambin Ci guardano</a:t>
+            </a:r>
+            <a:endParaRPr lang="en-US" b="1" dirty="0">
               <a:latin typeface="Arial" charset="0"/>
               <a:cs typeface="Arial" charset="0"/>
             </a:endParaRPr>
@@ -8668,30 +8768,18 @@
               <a:buNone/>
             </a:pPr>
             <a:r>
-              <a:rPr lang="en-US" b="1" dirty="0" smtClean="0">
+              <a:rPr lang="en-US" b="1" dirty="0">
                 <a:latin typeface="Arial" charset="0"/>
                 <a:cs typeface="Arial" charset="0"/>
               </a:rPr>
-              <a:t>MOVIES THEY LIKE: Godzilla (1954 version), Godzilla (1984 version), Godzilla (1998 version), Conan The Barbarian</a:t>
+              <a:t>MOVIES THEY HATE: Beauty and the Beast, Peter Pan.</a:t>
             </a:r>
           </a:p>
           <a:p>
             <a:pPr marL="0" indent="0">
               <a:buNone/>
             </a:pPr>
-            <a:r>
-              <a:rPr lang="en-US" b="1" dirty="0" smtClean="0">
-                <a:latin typeface="Arial" charset="0"/>
-                <a:cs typeface="Arial" charset="0"/>
-              </a:rPr>
-              <a:t>MOVIES THEY HATE: Apocalypse Now, lots of obscure movies.</a:t>
-            </a:r>
-          </a:p>
-          <a:p>
-            <a:pPr marL="0" indent="0">
-              <a:buNone/>
-            </a:pPr>
-            <a:endParaRPr lang="en-US" b="1" dirty="0" smtClean="0">
+            <a:endParaRPr lang="en-US" b="1" dirty="0">
               <a:latin typeface="Arial" charset="0"/>
               <a:cs typeface="Arial" charset="0"/>
             </a:endParaRPr>
@@ -8700,7 +8788,7 @@
             <a:pPr marL="0" indent="0">
               <a:buNone/>
             </a:pPr>
-            <a:endParaRPr lang="en-US" b="1" dirty="0" smtClean="0">
+            <a:endParaRPr lang="en-US" b="1" dirty="0">
               <a:latin typeface="Arial" charset="0"/>
               <a:cs typeface="Arial" charset="0"/>
             </a:endParaRPr>
@@ -8766,13 +8854,8 @@
           <a:p>
             <a:r>
               <a:rPr lang="en-US" dirty="0"/>
-              <a:t>::CLUSTER </a:t>
-            </a:r>
-            <a:r>
-              <a:rPr lang="en-US" dirty="0" smtClean="0"/>
-              <a:t>5 (Horrified Romantics)</a:t>
-            </a:r>
-            <a:endParaRPr lang="en-US" dirty="0"/>
+              <a:t>::CLUSTER 5 (Horror)</a:t>
+            </a:r>
           </a:p>
         </p:txBody>
       </p:sp>
@@ -8802,57 +8885,34 @@
             </a:r>
           </a:p>
           <a:p>
+            <a:endParaRPr lang="en-US" dirty="0"/>
+          </a:p>
+          <a:p>
+            <a:endParaRPr lang="en-US" dirty="0"/>
+          </a:p>
+          <a:p>
             <a:pPr marL="0" indent="0">
               <a:buNone/>
             </a:pPr>
             <a:r>
-              <a:rPr lang="en-US" b="1" dirty="0">
-                <a:latin typeface="Arial" charset="0"/>
-                <a:cs typeface="Arial" charset="0"/>
-              </a:rPr>
-              <a:t>male 0.6524822695035462 lower than normal</a:t>
-            </a:r>
-          </a:p>
-          <a:p>
-            <a:r>
-              <a:rPr lang="en-US" dirty="0" smtClean="0"/>
-              <a:t>Much </a:t>
-            </a:r>
-            <a:r>
-              <a:rPr lang="en-US" dirty="0"/>
-              <a:t>Younger in </a:t>
-            </a:r>
-            <a:r>
-              <a:rPr lang="en-US" dirty="0" smtClean="0"/>
-              <a:t>Age</a:t>
-            </a:r>
-          </a:p>
-          <a:p>
-            <a:endParaRPr lang="en-US" dirty="0"/>
+              <a:rPr lang="en-US" b="1" dirty="0"/>
+              <a:t>MOVIES THEY LIKE: Cape Fear, Poltergeist, Nightmare on Elm Street, Edward Scissorhands</a:t>
+            </a:r>
           </a:p>
           <a:p>
             <a:pPr marL="0" indent="0">
               <a:buNone/>
             </a:pPr>
             <a:r>
-              <a:rPr lang="en-US" b="1" dirty="0" smtClean="0"/>
-              <a:t>MOVIES THEY LIKE: Cape Fear, Poltergeist, Jerry Maguire, Lady and the Tramp, Addicted To Love</a:t>
-            </a:r>
-          </a:p>
-          <a:p>
-            <a:pPr marL="0" indent="0">
-              <a:buNone/>
-            </a:pPr>
-            <a:r>
-              <a:rPr lang="en-US" b="1" dirty="0" smtClean="0"/>
+              <a:rPr lang="en-US" b="1" dirty="0"/>
               <a:t>MOVIES THEY HATE: </a:t>
             </a:r>
             <a:r>
-              <a:rPr lang="en-US" b="1" dirty="0" err="1" smtClean="0"/>
+              <a:rPr lang="en-US" b="1" dirty="0" err="1"/>
               <a:t>Palookaville</a:t>
             </a:r>
             <a:r>
-              <a:rPr lang="en-US" b="1" dirty="0" smtClean="0"/>
+              <a:rPr lang="en-US" b="1" dirty="0"/>
               <a:t>, Philadelphia, lots of obscure ones</a:t>
             </a:r>
           </a:p>
@@ -8910,10 +8970,9 @@
           <a:lstStyle/>
           <a:p>
             <a:r>
-              <a:rPr lang="en-US" dirty="0" smtClean="0"/>
-              <a:t>::CLUSTER 6 (Horror)</a:t>
-            </a:r>
-            <a:endParaRPr lang="en-US" dirty="0"/>
+              <a:rPr lang="en-US" dirty="0"/>
+              <a:t>::CLUSTER 6 (Young)</a:t>
+            </a:r>
           </a:p>
         </p:txBody>
       </p:sp>
@@ -8937,40 +8996,66 @@
             <a:pPr marL="0" indent="0">
               <a:buNone/>
             </a:pPr>
-            <a:endParaRPr lang="en-US" dirty="0" smtClean="0"/>
+            <a:r>
+              <a:rPr lang="en-US" b="1" dirty="0">
+                <a:latin typeface="Arial" charset="0"/>
+                <a:cs typeface="Arial" charset="0"/>
+              </a:rPr>
+              <a:t>male 65% lower than normal</a:t>
+            </a:r>
+            <a:r>
+              <a:rPr lang="en-US" dirty="0">
+                <a:latin typeface="Arial" charset="0"/>
+                <a:cs typeface="Arial" charset="0"/>
+              </a:rPr>
+              <a:t> </a:t>
+            </a:r>
+          </a:p>
+          <a:p>
+            <a:r>
+              <a:rPr lang="en-US" dirty="0">
+                <a:latin typeface="Corbel" charset="0"/>
+              </a:rPr>
+              <a:t>Much Younger in Age</a:t>
+            </a:r>
           </a:p>
           <a:p>
             <a:pPr marL="0" indent="0">
               <a:buNone/>
             </a:pPr>
-            <a:r>
-              <a:rPr lang="en-US" dirty="0" smtClean="0"/>
-              <a:t>MOVIES THEY LIKE: The Body Snatcher, Children Of The Corn, They Bite</a:t>
-            </a:r>
-            <a:endParaRPr lang="en-US" dirty="0" smtClean="0"/>
+            <a:endParaRPr lang="en-US" dirty="0"/>
           </a:p>
           <a:p>
             <a:pPr marL="0" indent="0">
               <a:buNone/>
             </a:pPr>
             <a:r>
-              <a:rPr lang="en-US" dirty="0" smtClean="0"/>
-              <a:t>MOVIES THEY HATE: Forrest Gump, </a:t>
-            </a:r>
-            <a:r>
-              <a:rPr lang="en-US" dirty="0" err="1" smtClean="0"/>
+              <a:rPr lang="en-US" dirty="0"/>
+              <a:t>MOVIES THEY LIKE (very diverse): Raging Bull, They Bite</a:t>
+            </a:r>
+          </a:p>
+          <a:p>
+            <a:pPr marL="0" indent="0">
+              <a:buNone/>
+            </a:pPr>
+            <a:r>
+              <a:rPr lang="en-US" dirty="0"/>
+              <a:t>MOVIES THEY HATE : Forrest Gump, </a:t>
+            </a:r>
+            <a:r>
+              <a:rPr lang="en-US" dirty="0" err="1"/>
               <a:t>Goodfellas</a:t>
             </a:r>
             <a:r>
-              <a:rPr lang="en-US" dirty="0" smtClean="0"/>
+              <a:rPr lang="en-US" dirty="0"/>
               <a:t>, The Big </a:t>
             </a:r>
             <a:r>
-              <a:rPr lang="en-US" dirty="0" err="1" smtClean="0"/>
+              <a:rPr lang="en-US" dirty="0" err="1"/>
               <a:t>Lebowski</a:t>
             </a:r>
             <a:r>
-              <a:rPr lang="en-US" dirty="0" smtClean="0"/>
+              <a:rPr lang="en-US" dirty="0"/>
               <a:t>, Monty Python’s Life of Brian</a:t>
             </a:r>
           </a:p>
@@ -8979,10 +9064,9 @@
               <a:buNone/>
             </a:pPr>
             <a:r>
-              <a:rPr lang="en-US" dirty="0" smtClean="0"/>
+              <a:rPr lang="en-US" dirty="0"/>
               <a:t>	</a:t>
             </a:r>
-            <a:endParaRPr lang="en-US" dirty="0"/>
           </a:p>
         </p:txBody>
       </p:sp>
@@ -9086,6 +9170,123 @@
 </p:sld>
 </file>
 
+<file path=ppt/slides/slide19.xml><?xml version="1.0" encoding="utf-8"?>
+<p:sld xmlns:a="http://schemas.openxmlformats.org/drawingml/2006/main" xmlns:r="http://schemas.openxmlformats.org/officeDocument/2006/relationships" xmlns:p="http://schemas.openxmlformats.org/presentationml/2006/main">
+  <p:cSld>
+    <p:spTree>
+      <p:nvGrpSpPr>
+        <p:cNvPr id="1" name=""/>
+        <p:cNvGrpSpPr/>
+        <p:nvPr/>
+      </p:nvGrpSpPr>
+      <p:grpSpPr>
+        <a:xfrm>
+          <a:off x="0" y="0"/>
+          <a:ext cx="0" cy="0"/>
+          <a:chOff x="0" y="0"/>
+          <a:chExt cx="0" cy="0"/>
+        </a:xfrm>
+      </p:grpSpPr>
+      <p:sp>
+        <p:nvSpPr>
+          <p:cNvPr id="2" name="Title 1"/>
+          <p:cNvSpPr>
+            <a:spLocks noGrp="1"/>
+          </p:cNvSpPr>
+          <p:nvPr>
+            <p:ph type="title"/>
+          </p:nvPr>
+        </p:nvSpPr>
+        <p:spPr/>
+        <p:txBody>
+          <a:bodyPr/>
+          <a:lstStyle/>
+          <a:p>
+            <a:r>
+              <a:rPr lang="en-US"/>
+              <a:t>::Obstacles and Lessons</a:t>
+            </a:r>
+          </a:p>
+        </p:txBody>
+      </p:sp>
+      <p:sp>
+        <p:nvSpPr>
+          <p:cNvPr id="3" name="Content Placeholder 2"/>
+          <p:cNvSpPr>
+            <a:spLocks noGrp="1"/>
+          </p:cNvSpPr>
+          <p:nvPr>
+            <p:ph idx="1"/>
+          </p:nvPr>
+        </p:nvSpPr>
+        <p:spPr/>
+        <p:txBody>
+          <a:bodyPr vert="horz" lIns="91440" tIns="45720" rIns="91440" bIns="45720" rtlCol="0" anchor="t">
+            <a:normAutofit/>
+          </a:bodyPr>
+          <a:lstStyle/>
+          <a:p>
+            <a:r>
+              <a:rPr lang="en-US"/>
+              <a:t>difficult to consider many points within one map/reduce tasks</a:t>
+            </a:r>
+          </a:p>
+          <a:p>
+            <a:pPr lvl="1"/>
+            <a:r>
+              <a:rPr lang="en-US"/>
+              <a:t>large canopy still may not fit in memory</a:t>
+            </a:r>
+          </a:p>
+          <a:p>
+            <a:pPr lvl="1"/>
+            <a:r>
+              <a:rPr lang="en-US"/>
+              <a:t>aggregating points into a centroid means information lost</a:t>
+            </a:r>
+          </a:p>
+          <a:p>
+            <a:r>
+              <a:rPr lang="en-US"/>
+              <a:t>Distance difficult to measure in high dimensionality</a:t>
+            </a:r>
+          </a:p>
+          <a:p>
+            <a:pPr lvl="1"/>
+            <a:r>
+              <a:rPr lang="en-US"/>
+              <a:t>euclidean, cosine, manhattan: points appear equally far part, even with weights</a:t>
+            </a:r>
+          </a:p>
+          <a:p>
+            <a:pPr lvl="1"/>
+            <a:r>
+              <a:rPr lang="en-US"/>
+              <a:t>comparing sparse vs sparse vectors (user vs. user)</a:t>
+            </a:r>
+          </a:p>
+          <a:p>
+            <a:pPr lvl="1"/>
+            <a:r>
+              <a:rPr lang="en-US"/>
+              <a:t>comparing sparse vs dense vectors (user vs. centroid) </a:t>
+            </a:r>
+          </a:p>
+        </p:txBody>
+      </p:sp>
+    </p:spTree>
+    <p:extLst>
+      <p:ext uri="{BB962C8B-B14F-4D97-AF65-F5344CB8AC3E}">
+        <p14:creationId xmlns:p14="http://schemas.microsoft.com/office/powerpoint/2010/main" val="777519099"/>
+      </p:ext>
+    </p:extLst>
+  </p:cSld>
+  <p:clrMapOvr>
+    <a:masterClrMapping/>
+  </p:clrMapOvr>
+</p:sld>
+</file>
+
 <file path=ppt/slides/slide2.xml><?xml version="1.0" encoding="utf-8"?>
 <p:sld xmlns:a="http://schemas.openxmlformats.org/drawingml/2006/main" xmlns:r="http://schemas.openxmlformats.org/officeDocument/2006/relationships" xmlns:p="http://schemas.openxmlformats.org/presentationml/2006/main">
   <p:cSld>
@@ -9144,7 +9345,7 @@
           <a:p>
             <a:r>
               <a:rPr lang="en-US"/>
-              <a:t>Group data points into meaningful clusters.</a:t>
+              <a:t>Cluster users based on the movies they rated</a:t>
             </a:r>
           </a:p>
           <a:p>
@@ -9179,6 +9380,109 @@
     <p:extLst>
       <p:ext uri="{BB962C8B-B14F-4D97-AF65-F5344CB8AC3E}">
         <p14:creationId xmlns:p14="http://schemas.microsoft.com/office/powerpoint/2010/main" val="3312666727"/>
+      </p:ext>
+    </p:extLst>
+  </p:cSld>
+  <p:clrMapOvr>
+    <a:masterClrMapping/>
+  </p:clrMapOvr>
+</p:sld>
+</file>
+
+<file path=ppt/slides/slide20.xml><?xml version="1.0" encoding="utf-8"?>
+<p:sld xmlns:a="http://schemas.openxmlformats.org/drawingml/2006/main" xmlns:r="http://schemas.openxmlformats.org/officeDocument/2006/relationships" xmlns:p="http://schemas.openxmlformats.org/presentationml/2006/main">
+  <p:cSld>
+    <p:spTree>
+      <p:nvGrpSpPr>
+        <p:cNvPr id="1" name=""/>
+        <p:cNvGrpSpPr/>
+        <p:nvPr/>
+      </p:nvGrpSpPr>
+      <p:grpSpPr>
+        <a:xfrm>
+          <a:off x="0" y="0"/>
+          <a:ext cx="0" cy="0"/>
+          <a:chOff x="0" y="0"/>
+          <a:chExt cx="0" cy="0"/>
+        </a:xfrm>
+      </p:grpSpPr>
+      <p:sp>
+        <p:nvSpPr>
+          <p:cNvPr id="2" name="Title 1"/>
+          <p:cNvSpPr>
+            <a:spLocks noGrp="1"/>
+          </p:cNvSpPr>
+          <p:nvPr>
+            <p:ph type="title"/>
+          </p:nvPr>
+        </p:nvSpPr>
+        <p:spPr/>
+        <p:txBody>
+          <a:bodyPr/>
+          <a:lstStyle/>
+          <a:p>
+            <a:r>
+              <a:rPr lang="en-US" dirty="0">
+                <a:latin typeface="Corbel" charset="0"/>
+              </a:rPr>
+              <a:t>::Obstacles and Lessons</a:t>
+            </a:r>
+          </a:p>
+        </p:txBody>
+      </p:sp>
+      <p:sp>
+        <p:nvSpPr>
+          <p:cNvPr id="3" name="Content Placeholder 2"/>
+          <p:cNvSpPr>
+            <a:spLocks noGrp="1"/>
+          </p:cNvSpPr>
+          <p:nvPr>
+            <p:ph idx="1"/>
+          </p:nvPr>
+        </p:nvSpPr>
+        <p:spPr/>
+        <p:txBody>
+          <a:bodyPr vert="horz" lIns="91440" tIns="45720" rIns="91440" bIns="45720" rtlCol="0" anchor="t">
+            <a:normAutofit/>
+          </a:bodyPr>
+          <a:lstStyle/>
+          <a:p>
+            <a:r>
+              <a:rPr lang="en-US"/>
+              <a:t>Distance computation still costly when vectors involved is very high dimension</a:t>
+            </a:r>
+          </a:p>
+          <a:p>
+            <a:pPr lvl="1"/>
+            <a:r>
+              <a:rPr lang="en-US"/>
+              <a:t>naive hierarchical clustering originally required O(n^3)</a:t>
+            </a:r>
+          </a:p>
+          <a:p>
+            <a:pPr lvl="1"/>
+            <a:r>
+              <a:rPr lang="en-US"/>
+              <a:t>with optimization, closer to O(n^2)</a:t>
+            </a:r>
+          </a:p>
+          <a:p>
+            <a:pPr lvl="1"/>
+            <a:r>
+              <a:rPr lang="en-US"/>
+              <a:t>Barely feasible even with n=350</a:t>
+            </a:r>
+          </a:p>
+          <a:p>
+            <a:pPr lvl="1"/>
+            <a:endParaRPr lang="en-US"/>
+          </a:p>
+        </p:txBody>
+      </p:sp>
+    </p:spTree>
+    <p:extLst>
+      <p:ext uri="{BB962C8B-B14F-4D97-AF65-F5344CB8AC3E}">
+        <p14:creationId xmlns:p14="http://schemas.microsoft.com/office/powerpoint/2010/main" val="1525510628"/>
       </p:ext>
     </p:extLst>
   </p:cSld>
@@ -9222,7 +9526,7 @@
           <a:p>
             <a:r>
               <a:rPr lang="en-US"/>
-              <a:t>::APPROACH</a:t>
+              <a:t>::INIITAL APPROACH</a:t>
             </a:r>
           </a:p>
         </p:txBody>
@@ -9260,7 +9564,7 @@
             <a:pPr lvl="2"/>
             <a:r>
               <a:rPr lang="en-US"/>
-              <a:t>Rough clustering of data utilizing an inexpensive distance metric. </a:t>
+              <a:t>Rough clustering of partitioned data utilizing an inexpensive distance metric. </a:t>
             </a:r>
           </a:p>
           <a:p>
@@ -9271,6 +9575,13 @@
             </a:r>
           </a:p>
           <a:p>
+            <a:pPr lvl="2"/>
+            <a:r>
+              <a:rPr lang="en-US"/>
+              <a:t>Identify centroids based on all canopies found</a:t>
+            </a:r>
+          </a:p>
+          <a:p>
             <a:pPr lvl="1"/>
             <a:r>
               <a:rPr lang="en-US"/>
@@ -9281,7 +9592,7 @@
             <a:pPr lvl="2"/>
             <a:r>
               <a:rPr lang="en-US"/>
-              <a:t>A distance metric with a more rigid bound is employed to subcluster the canopies into the final result. </a:t>
+              <a:t>A distance metric with a more rigid bound is employed to subcluster points within a canopy</a:t>
             </a:r>
           </a:p>
           <a:p>
@@ -9370,7 +9681,7 @@
           <a:p>
             <a:r>
               <a:rPr lang="en-US"/>
-              <a:t>threw away  rarely rated movies to prevent skew. </a:t>
+              <a:t>threw away rarely rated movies to prevent skew, reduce dimensions </a:t>
             </a:r>
           </a:p>
           <a:p>
@@ -9670,7 +9981,7 @@
                 </a:solidFill>
                 <a:latin typeface="Corbel"/>
               </a:rPr>
-              <a:t>Jaccard Bag:</a:t>
+              <a:t>Jaccard Bag similarity example:</a:t>
             </a:r>
           </a:p>
           <a:p>
@@ -9682,17 +9993,11 @@
                 </a:solidFill>
                 <a:latin typeface="Corbel"/>
               </a:rPr>
-              <a:t>If a user </a:t>
-            </a:r>
-            <a:r>
-              <a:rPr lang="en-US" i="1">
-                <a:solidFill>
-                  <a:srgbClr val="EDEDED"/>
-                </a:solidFill>
-                <a:latin typeface="Corbel"/>
-              </a:rPr>
-              <a:t>x </a:t>
-            </a:r>
+              <a:t>User A rates movie X with 3, Y with 1</a:t>
+            </a:r>
+          </a:p>
+          <a:p>
+            <a:pPr lvl="1"/>
             <a:r>
               <a:rPr lang="en-US">
                 <a:solidFill>
@@ -9700,17 +10005,11 @@
                 </a:solidFill>
                 <a:latin typeface="Corbel"/>
               </a:rPr>
-              <a:t>assigns a rating of 3 to movie </a:t>
-            </a:r>
-            <a:r>
-              <a:rPr lang="en-US" i="1">
-                <a:solidFill>
-                  <a:srgbClr val="EDEDED"/>
-                </a:solidFill>
-                <a:latin typeface="Corbel"/>
-              </a:rPr>
-              <a:t>y. </a:t>
-            </a:r>
+              <a:t>User B rates movie X with 2, Y with 4</a:t>
+            </a:r>
+          </a:p>
+          <a:p>
+            <a:pPr lvl="1"/>
             <a:r>
               <a:rPr lang="en-US">
                 <a:solidFill>
@@ -9718,11 +10017,46 @@
                 </a:solidFill>
                 <a:latin typeface="Corbel"/>
               </a:rPr>
-              <a:t>we put y's ID in the Jaccard set of user x three times. </a:t>
+              <a:t>A's bag = { x, x, x, y }, Y's bag = { x, x, y, y, y, y }</a:t>
             </a:r>
           </a:p>
           <a:p>
             <a:pPr lvl="1"/>
+            <a:r>
+              <a:rPr lang="en-US">
+                <a:solidFill>
+                  <a:srgbClr val="EDEDED"/>
+                </a:solidFill>
+                <a:latin typeface="Corbel"/>
+              </a:rPr>
+              <a:t>union = 2 + 1</a:t>
+            </a:r>
+          </a:p>
+          <a:p>
+            <a:pPr lvl="1"/>
+            <a:r>
+              <a:rPr lang="en-US">
+                <a:solidFill>
+                  <a:srgbClr val="EDEDED"/>
+                </a:solidFill>
+                <a:latin typeface="Corbel"/>
+              </a:rPr>
+              <a:t>intersection = 10</a:t>
+            </a:r>
+          </a:p>
+          <a:p>
+            <a:pPr lvl="1"/>
+            <a:r>
+              <a:rPr lang="en-US">
+                <a:solidFill>
+                  <a:srgbClr val="EDEDED"/>
+                </a:solidFill>
+                <a:latin typeface="Corbel"/>
+              </a:rPr>
+              <a:t>similarity = 4/10</a:t>
+            </a:r>
+          </a:p>
+          <a:p>
             <a:r>
               <a:rPr lang="en-US">
                 <a:solidFill>
@@ -9782,7 +10116,7 @@
           <a:p>
             <a:r>
               <a:rPr lang="en-US"/>
-              <a:t>::STEP 1: First Attempt</a:t>
+              <a:t>::STEP 1: Initial Attempts</a:t>
             </a:r>
           </a:p>
         </p:txBody>
@@ -9892,7 +10226,7 @@
           <a:p>
             <a:r>
               <a:rPr lang="en-US"/>
-              <a:t>::STEP1: First Attempt </a:t>
+              <a:t>::STEP1: Initial Attempts</a:t>
             </a:r>
           </a:p>
         </p:txBody>
@@ -9920,6 +10254,7 @@
             </a:r>
           </a:p>
           <a:p>
+            <a:pPr lvl="1"/>
             <a:r>
               <a:rPr lang="en-US"/>
               <a:t>~1000, and after reducer task that number went down to ~100.</a:t>
@@ -9928,11 +10263,35 @@
           <a:p>
             <a:r>
               <a:rPr lang="en-US"/>
-              <a:t>Fine-tuning T1 and T2 did not change output much.</a:t>
-            </a:r>
-          </a:p>
-          <a:p>
-            <a:endParaRPr lang="en-US"/>
+              <a:t>Fine-tuning T1 and T2 produced a no-win trade-off</a:t>
+            </a:r>
+          </a:p>
+          <a:p>
+            <a:pPr lvl="1"/>
+            <a:r>
+              <a:rPr lang="en-US"/>
+              <a:t>smaller threshold produced tighter canopies, but too many</a:t>
+            </a:r>
+          </a:p>
+          <a:p>
+            <a:pPr lvl="1"/>
+            <a:r>
+              <a:rPr lang="en-US"/>
+              <a:t>larger threshold produced less canopies, but too many points within 1 canopy - up to 50% of all points considered</a:t>
+            </a:r>
+          </a:p>
+          <a:p>
+            <a:r>
+              <a:rPr lang="en-US"/>
+              <a:t>Some random points have very few or no neighbors</a:t>
+            </a:r>
+          </a:p>
+          <a:p>
+            <a:pPr lvl="1"/>
+            <a:r>
+              <a:rPr lang="en-US"/>
+              <a:t>decided to set limit on how long a mapper should sample for canopies </a:t>
+            </a:r>
           </a:p>
           <a:p>
             <a:r>
@@ -10030,7 +10389,7 @@
                 </a:solidFill>
                 <a:latin typeface="Corbel" charset="0"/>
               </a:rPr>
-              <a:t>From massaged inputs, find canopies and centroids</a:t>
+              <a:t>Find canopies and centroids among the points within one mapper</a:t>
             </a:r>
             <a:endParaRPr lang="en-US">
               <a:solidFill>
@@ -10092,7 +10451,7 @@
                 </a:solidFill>
                 <a:latin typeface="Corbel" charset="0"/>
               </a:rPr>
-              <a:t>Combine centroids that are too close together</a:t>
+              <a:t>Use hierarchical clustering (cosine similarity) to combine centroids that are too close together, stopping at the average number of canopies found</a:t>
             </a:r>
           </a:p>
           <a:p>

</xml_diff>